<commit_message>
Day 35 content updated
</commit_message>
<xml_diff>
--- a/Day33/DockerAndKubernetes_Training-Day33.pptx
+++ b/Day33/DockerAndKubernetes_Training-Day33.pptx
@@ -199,7 +199,7 @@
           <a:p>
             <a:fld id="{B09F413D-6E72-4B8A-80ED-A580F7C91B71}" type="datetimeFigureOut">
               <a:rPr lang="en-IN" smtClean="0"/>
-              <a:t>18-05-2023</a:t>
+              <a:t>20-05-2023</a:t>
             </a:fld>
             <a:endParaRPr lang="en-IN"/>
           </a:p>
@@ -802,7 +802,7 @@
           <a:p>
             <a:fld id="{12E8600E-B0EE-4521-BF40-4B72FBA06775}" type="datetimeFigureOut">
               <a:rPr lang="en-IN" smtClean="0"/>
-              <a:t>18-05-2023</a:t>
+              <a:t>20-05-2023</a:t>
             </a:fld>
             <a:endParaRPr lang="en-IN"/>
           </a:p>
@@ -1891,7 +1891,7 @@
             <a:fld id="{49F3E739-D457-46E5-B626-C9B182A007EE}" type="datetimeFigureOut">
               <a:rPr lang="en-US" smtClean="0"/>
               <a:pPr/>
-              <a:t>5/18/2023</a:t>
+              <a:t>5/20/2023</a:t>
             </a:fld>
             <a:endParaRPr lang="en-US"/>
           </a:p>
@@ -2873,7 +2873,7 @@
             <a:fld id="{49F3E739-D457-46E5-B626-C9B182A007EE}" type="datetimeFigureOut">
               <a:rPr lang="en-US" smtClean="0"/>
               <a:pPr/>
-              <a:t>5/18/2023</a:t>
+              <a:t>5/20/2023</a:t>
             </a:fld>
             <a:endParaRPr lang="en-US"/>
           </a:p>
@@ -4009,7 +4009,7 @@
             <a:fld id="{49F3E739-D457-46E5-B626-C9B182A007EE}" type="datetimeFigureOut">
               <a:rPr lang="en-US" smtClean="0"/>
               <a:pPr/>
-              <a:t>5/18/2023</a:t>
+              <a:t>5/20/2023</a:t>
             </a:fld>
             <a:endParaRPr lang="en-US"/>
           </a:p>
@@ -5044,7 +5044,7 @@
             <a:fld id="{49F3E739-D457-46E5-B626-C9B182A007EE}" type="datetimeFigureOut">
               <a:rPr lang="en-US" smtClean="0"/>
               <a:pPr/>
-              <a:t>5/18/2023</a:t>
+              <a:t>5/20/2023</a:t>
             </a:fld>
             <a:endParaRPr lang="en-US"/>
           </a:p>
@@ -5706,7 +5706,7 @@
             <a:fld id="{49F3E739-D457-46E5-B626-C9B182A007EE}" type="datetimeFigureOut">
               <a:rPr lang="en-US" smtClean="0"/>
               <a:pPr/>
-              <a:t>5/18/2023</a:t>
+              <a:t>5/20/2023</a:t>
             </a:fld>
             <a:endParaRPr lang="en-US"/>
           </a:p>
@@ -6569,7 +6569,7 @@
             <a:fld id="{49F3E739-D457-46E5-B626-C9B182A007EE}" type="datetimeFigureOut">
               <a:rPr lang="en-US" smtClean="0"/>
               <a:pPr/>
-              <a:t>5/18/2023</a:t>
+              <a:t>5/20/2023</a:t>
             </a:fld>
             <a:endParaRPr lang="en-US"/>
           </a:p>
@@ -6760,7 +6760,7 @@
           <a:p>
             <a:fld id="{12E8600E-B0EE-4521-BF40-4B72FBA06775}" type="datetimeFigureOut">
               <a:rPr lang="en-IN" smtClean="0"/>
-              <a:t>18-05-2023</a:t>
+              <a:t>20-05-2023</a:t>
             </a:fld>
             <a:endParaRPr lang="en-IN"/>
           </a:p>
@@ -7732,7 +7732,7 @@
           <a:p>
             <a:fld id="{12E8600E-B0EE-4521-BF40-4B72FBA06775}" type="datetimeFigureOut">
               <a:rPr lang="en-IN" smtClean="0"/>
-              <a:t>18-05-2023</a:t>
+              <a:t>20-05-2023</a:t>
             </a:fld>
             <a:endParaRPr lang="en-IN"/>
           </a:p>
@@ -7943,7 +7943,7 @@
           <a:p>
             <a:fld id="{12E8600E-B0EE-4521-BF40-4B72FBA06775}" type="datetimeFigureOut">
               <a:rPr lang="en-IN" smtClean="0"/>
-              <a:t>18-05-2023</a:t>
+              <a:t>20-05-2023</a:t>
             </a:fld>
             <a:endParaRPr lang="en-IN"/>
           </a:p>
@@ -8977,7 +8977,7 @@
           <a:p>
             <a:fld id="{12E8600E-B0EE-4521-BF40-4B72FBA06775}" type="datetimeFigureOut">
               <a:rPr lang="en-IN" smtClean="0"/>
-              <a:t>18-05-2023</a:t>
+              <a:t>20-05-2023</a:t>
             </a:fld>
             <a:endParaRPr lang="en-IN"/>
           </a:p>
@@ -9249,7 +9249,7 @@
           <a:p>
             <a:fld id="{12E8600E-B0EE-4521-BF40-4B72FBA06775}" type="datetimeFigureOut">
               <a:rPr lang="en-IN" smtClean="0"/>
-              <a:t>18-05-2023</a:t>
+              <a:t>20-05-2023</a:t>
             </a:fld>
             <a:endParaRPr lang="en-IN"/>
           </a:p>
@@ -9660,7 +9660,7 @@
             <a:fld id="{49F3E739-D457-46E5-B626-C9B182A007EE}" type="datetimeFigureOut">
               <a:rPr lang="en-US" smtClean="0"/>
               <a:pPr/>
-              <a:t>5/18/2023</a:t>
+              <a:t>5/20/2023</a:t>
             </a:fld>
             <a:endParaRPr lang="en-US"/>
           </a:p>
@@ -9788,7 +9788,7 @@
           <a:p>
             <a:fld id="{12E8600E-B0EE-4521-BF40-4B72FBA06775}" type="datetimeFigureOut">
               <a:rPr lang="en-IN" smtClean="0"/>
-              <a:t>18-05-2023</a:t>
+              <a:t>20-05-2023</a:t>
             </a:fld>
             <a:endParaRPr lang="en-IN"/>
           </a:p>
@@ -9883,7 +9883,7 @@
           <a:p>
             <a:fld id="{12E8600E-B0EE-4521-BF40-4B72FBA06775}" type="datetimeFigureOut">
               <a:rPr lang="en-IN" smtClean="0"/>
-              <a:t>18-05-2023</a:t>
+              <a:t>20-05-2023</a:t>
             </a:fld>
             <a:endParaRPr lang="en-IN"/>
           </a:p>
@@ -10964,7 +10964,7 @@
           <a:p>
             <a:fld id="{12E8600E-B0EE-4521-BF40-4B72FBA06775}" type="datetimeFigureOut">
               <a:rPr lang="en-IN" smtClean="0"/>
-              <a:t>18-05-2023</a:t>
+              <a:t>20-05-2023</a:t>
             </a:fld>
             <a:endParaRPr lang="en-IN"/>
           </a:p>
@@ -12073,7 +12073,7 @@
             <a:fld id="{49F3E739-D457-46E5-B626-C9B182A007EE}" type="datetimeFigureOut">
               <a:rPr lang="en-US" smtClean="0"/>
               <a:pPr/>
-              <a:t>5/18/2023</a:t>
+              <a:t>5/20/2023</a:t>
             </a:fld>
             <a:endParaRPr lang="en-US"/>
           </a:p>
@@ -13072,7 +13072,7 @@
             <a:fld id="{49F3E739-D457-46E5-B626-C9B182A007EE}" type="datetimeFigureOut">
               <a:rPr lang="en-US" smtClean="0"/>
               <a:pPr/>
-              <a:t>5/18/2023</a:t>
+              <a:t>5/20/2023</a:t>
             </a:fld>
             <a:endParaRPr lang="en-US"/>
           </a:p>
@@ -13660,7 +13660,7 @@
           <a:p>
             <a:r>
               <a:rPr lang="en-US" sz="4800" b="1" i="1" dirty="0"/>
-              <a:t>DAY 32</a:t>
+              <a:t>DAY 35</a:t>
             </a:r>
             <a:endParaRPr lang="en-IN" sz="4800" b="1" i="1" dirty="0"/>
           </a:p>
@@ -14049,17 +14049,14 @@
           <a:p>
             <a:r>
               <a:rPr lang="en-US" dirty="0"/>
-              <a:t>Stateful Set understanding and use cases</a:t>
+              <a:t>statefulset understanding and use cases</a:t>
             </a:r>
           </a:p>
           <a:p>
-            <a:pPr marL="457200" lvl="1" indent="0">
-              <a:buNone/>
-            </a:pPr>
-            <a:endParaRPr lang="en-IN" dirty="0"/>
-          </a:p>
-          <a:p>
-            <a:pPr lvl="1"/>
+            <a:r>
+              <a:rPr lang="en-US" dirty="0"/>
+              <a:t>Statefulset Demo</a:t>
+            </a:r>
             <a:endParaRPr lang="en-IN" dirty="0"/>
           </a:p>
         </p:txBody>
@@ -14141,8 +14138,8 @@
         </p:nvSpPr>
         <p:spPr>
           <a:xfrm>
-            <a:off x="0" y="2278505"/>
-            <a:ext cx="12192000" cy="4579495"/>
+            <a:off x="478302" y="2503589"/>
+            <a:ext cx="11535507" cy="4066024"/>
           </a:xfrm>
         </p:spPr>
         <p:txBody>
@@ -14178,16 +14175,16 @@
             </a:r>
           </a:p>
           <a:p>
-            <a:endParaRPr lang="en-US" dirty="0"/>
-          </a:p>
-          <a:p>
-            <a:r>
-              <a:rPr lang="en-US" dirty="0" err="1"/>
-              <a:t>Statefulset</a:t>
-            </a:r>
+            <a:pPr lvl="1"/>
             <a:r>
               <a:rPr lang="en-US" dirty="0"/>
-              <a:t>:</a:t>
+              <a:t>https://devopscube.com/persistent-volume-google-kubernetes-engine/</a:t>
+            </a:r>
+          </a:p>
+          <a:p>
+            <a:r>
+              <a:rPr lang="en-US" dirty="0"/>
+              <a:t>Statefulset:</a:t>
             </a:r>
           </a:p>
           <a:p>

</xml_diff>